<commit_message>
Added Stuff to Task 12
</commit_message>
<xml_diff>
--- a/doc/task12/Statepattern.pptx
+++ b/doc/task12/Statepattern.pptx
@@ -9,11 +9,10 @@
     <p:sldId id="257" r:id="rId3"/>
     <p:sldId id="259" r:id="rId4"/>
     <p:sldId id="265" r:id="rId5"/>
-    <p:sldId id="270" r:id="rId6"/>
-    <p:sldId id="268" r:id="rId7"/>
-    <p:sldId id="269" r:id="rId8"/>
-    <p:sldId id="267" r:id="rId9"/>
-    <p:sldId id="261" r:id="rId10"/>
+    <p:sldId id="271" r:id="rId6"/>
+    <p:sldId id="270" r:id="rId7"/>
+    <p:sldId id="267" r:id="rId8"/>
+    <p:sldId id="261" r:id="rId9"/>
   </p:sldIdLst>
   <p:sldSz cx="12192000" cy="6858000"/>
   <p:notesSz cx="6858000" cy="9144000"/>
@@ -3298,7 +3297,6 @@
               <a:rPr lang="de-CH" sz="3600" dirty="0" smtClean="0"/>
               <a:t>Vorteile / Nachteile</a:t>
             </a:r>
-            <a:endParaRPr lang="de-CH" sz="3600" dirty="0" smtClean="0"/>
           </a:p>
           <a:p>
             <a:pPr marL="285750" indent="-285750">
@@ -3312,7 +3310,6 @@
               <a:rPr lang="de-CH" sz="3600" dirty="0" smtClean="0"/>
               <a:t>Implementation</a:t>
             </a:r>
-            <a:endParaRPr lang="de-CH" sz="3600" dirty="0" smtClean="0"/>
           </a:p>
           <a:p>
             <a:pPr marL="285750" indent="-285750">
@@ -3750,7 +3747,6 @@
               <a:rPr lang="de-CH" sz="3600" dirty="0" smtClean="0"/>
               <a:t>+ Einfache Neuimplementierungen</a:t>
             </a:r>
-            <a:endParaRPr lang="de-CH" sz="3600" dirty="0" smtClean="0"/>
           </a:p>
           <a:p>
             <a:pPr marL="285750" indent="-285750">
@@ -3764,7 +3760,6 @@
               <a:rPr lang="de-CH" sz="3600" dirty="0" smtClean="0"/>
               <a:t>+ Linearität</a:t>
             </a:r>
-            <a:endParaRPr lang="de-CH" sz="3600" dirty="0" smtClean="0"/>
           </a:p>
           <a:p>
             <a:pPr marL="285750" indent="-285750">
@@ -3890,7 +3885,7 @@
         </p:spPr>
         <p:txBody>
           <a:bodyPr vert="horz" lIns="91440" tIns="45720" rIns="91440" bIns="45720" rtlCol="0" anchor="b">
-            <a:normAutofit fontScale="70000" lnSpcReduction="20000"/>
+            <a:normAutofit/>
           </a:bodyPr>
           <a:lstStyle>
             <a:lvl1pPr algn="ctr" defTabSz="914400" rtl="0" eaLnBrk="1" latinLnBrk="0" hangingPunct="1">
@@ -3919,7 +3914,7 @@
                   <a:schemeClr val="bg1"/>
                 </a:solidFill>
               </a:rPr>
-              <a:t>Implementierung / Klassendiagramm</a:t>
+              <a:t>Vorteile / Nachteile</a:t>
             </a:r>
             <a:endParaRPr lang="de-CH" sz="7200" b="1" dirty="0">
               <a:solidFill>
@@ -3931,14 +3926,1426 @@
       </p:sp>
       <p:sp>
         <p:nvSpPr>
-          <p:cNvPr id="8" name="Textfeld 7"/>
+          <p:cNvPr id="8" name="Ellipse 7"/>
+          <p:cNvSpPr/>
+          <p:nvPr/>
+        </p:nvSpPr>
+        <p:spPr>
+          <a:xfrm>
+            <a:off x="464024" y="469730"/>
+            <a:ext cx="2582116" cy="1251756"/>
+          </a:xfrm>
+          <a:prstGeom prst="ellipse">
+            <a:avLst/>
+          </a:prstGeom>
+          <a:ln>
+            <a:solidFill>
+              <a:schemeClr val="tx1"/>
+            </a:solidFill>
+          </a:ln>
+        </p:spPr>
+        <p:style>
+          <a:lnRef idx="2">
+            <a:schemeClr val="accent6"/>
+          </a:lnRef>
+          <a:fillRef idx="1">
+            <a:schemeClr val="lt1"/>
+          </a:fillRef>
+          <a:effectRef idx="0">
+            <a:schemeClr val="accent6"/>
+          </a:effectRef>
+          <a:fontRef idx="minor">
+            <a:schemeClr val="dk1"/>
+          </a:fontRef>
+        </p:style>
+        <p:txBody>
+          <a:bodyPr rtlCol="0" anchor="ctr"/>
+          <a:lstStyle/>
+          <a:p>
+            <a:pPr algn="ctr"/>
+            <a:r>
+              <a:rPr lang="de-CH" b="1" dirty="0" err="1" smtClean="0"/>
+              <a:t>Ready</a:t>
+            </a:r>
+            <a:endParaRPr lang="de-CH" b="1" dirty="0"/>
+          </a:p>
+        </p:txBody>
+      </p:sp>
+      <p:sp>
+        <p:nvSpPr>
+          <p:cNvPr id="9" name="Ellipse 8"/>
+          <p:cNvSpPr/>
+          <p:nvPr/>
+        </p:nvSpPr>
+        <p:spPr>
+          <a:xfrm>
+            <a:off x="464023" y="2229840"/>
+            <a:ext cx="2582116" cy="1251756"/>
+          </a:xfrm>
+          <a:prstGeom prst="ellipse">
+            <a:avLst/>
+          </a:prstGeom>
+          <a:ln>
+            <a:solidFill>
+              <a:schemeClr val="tx1"/>
+            </a:solidFill>
+          </a:ln>
+        </p:spPr>
+        <p:style>
+          <a:lnRef idx="2">
+            <a:schemeClr val="accent6"/>
+          </a:lnRef>
+          <a:fillRef idx="1">
+            <a:schemeClr val="lt1"/>
+          </a:fillRef>
+          <a:effectRef idx="0">
+            <a:schemeClr val="accent6"/>
+          </a:effectRef>
+          <a:fontRef idx="minor">
+            <a:schemeClr val="dk1"/>
+          </a:fontRef>
+        </p:style>
+        <p:txBody>
+          <a:bodyPr rtlCol="0" anchor="ctr"/>
+          <a:lstStyle/>
+          <a:p>
+            <a:pPr algn="ctr"/>
+            <a:r>
+              <a:rPr lang="de-CH" b="1" dirty="0" err="1" smtClean="0"/>
+              <a:t>Started</a:t>
+            </a:r>
+            <a:endParaRPr lang="de-CH" b="1" dirty="0"/>
+          </a:p>
+        </p:txBody>
+      </p:sp>
+      <p:sp>
+        <p:nvSpPr>
+          <p:cNvPr id="10" name="Ellipse 9"/>
+          <p:cNvSpPr/>
+          <p:nvPr/>
+        </p:nvSpPr>
+        <p:spPr>
+          <a:xfrm>
+            <a:off x="464023" y="3989950"/>
+            <a:ext cx="2582116" cy="1251756"/>
+          </a:xfrm>
+          <a:prstGeom prst="ellipse">
+            <a:avLst/>
+          </a:prstGeom>
+          <a:ln>
+            <a:solidFill>
+              <a:schemeClr val="tx1"/>
+            </a:solidFill>
+          </a:ln>
+        </p:spPr>
+        <p:style>
+          <a:lnRef idx="2">
+            <a:schemeClr val="accent6"/>
+          </a:lnRef>
+          <a:fillRef idx="1">
+            <a:schemeClr val="lt1"/>
+          </a:fillRef>
+          <a:effectRef idx="0">
+            <a:schemeClr val="accent6"/>
+          </a:effectRef>
+          <a:fontRef idx="minor">
+            <a:schemeClr val="dk1"/>
+          </a:fontRef>
+        </p:style>
+        <p:txBody>
+          <a:bodyPr rtlCol="0" anchor="ctr"/>
+          <a:lstStyle/>
+          <a:p>
+            <a:pPr algn="ctr"/>
+            <a:r>
+              <a:rPr lang="de-CH" b="1" dirty="0" err="1" smtClean="0"/>
+              <a:t>Finished</a:t>
+            </a:r>
+            <a:endParaRPr lang="de-CH" b="1" dirty="0"/>
+          </a:p>
+        </p:txBody>
+      </p:sp>
+      <p:sp>
+        <p:nvSpPr>
+          <p:cNvPr id="11" name="Ellipse 10"/>
+          <p:cNvSpPr/>
+          <p:nvPr/>
+        </p:nvSpPr>
+        <p:spPr>
+          <a:xfrm>
+            <a:off x="4032537" y="3648122"/>
+            <a:ext cx="2582116" cy="1251756"/>
+          </a:xfrm>
+          <a:prstGeom prst="ellipse">
+            <a:avLst/>
+          </a:prstGeom>
+          <a:ln>
+            <a:solidFill>
+              <a:schemeClr val="tx1"/>
+            </a:solidFill>
+          </a:ln>
+        </p:spPr>
+        <p:style>
+          <a:lnRef idx="2">
+            <a:schemeClr val="accent6"/>
+          </a:lnRef>
+          <a:fillRef idx="1">
+            <a:schemeClr val="lt1"/>
+          </a:fillRef>
+          <a:effectRef idx="0">
+            <a:schemeClr val="accent6"/>
+          </a:effectRef>
+          <a:fontRef idx="minor">
+            <a:schemeClr val="dk1"/>
+          </a:fontRef>
+        </p:style>
+        <p:txBody>
+          <a:bodyPr rtlCol="0" anchor="ctr"/>
+          <a:lstStyle/>
+          <a:p>
+            <a:pPr algn="ctr"/>
+            <a:r>
+              <a:rPr lang="de-CH" b="1" dirty="0" err="1" smtClean="0"/>
+              <a:t>Closed</a:t>
+            </a:r>
+            <a:endParaRPr lang="de-CH" b="1" dirty="0"/>
+          </a:p>
+        </p:txBody>
+      </p:sp>
+      <p:sp>
+        <p:nvSpPr>
+          <p:cNvPr id="12" name="Ellipse 11"/>
+          <p:cNvSpPr/>
+          <p:nvPr/>
+        </p:nvSpPr>
+        <p:spPr>
+          <a:xfrm>
+            <a:off x="5336522" y="469729"/>
+            <a:ext cx="2582116" cy="1251756"/>
+          </a:xfrm>
+          <a:prstGeom prst="ellipse">
+            <a:avLst/>
+          </a:prstGeom>
+          <a:ln>
+            <a:solidFill>
+              <a:schemeClr val="tx1"/>
+            </a:solidFill>
+          </a:ln>
+        </p:spPr>
+        <p:style>
+          <a:lnRef idx="2">
+            <a:schemeClr val="accent6"/>
+          </a:lnRef>
+          <a:fillRef idx="1">
+            <a:schemeClr val="lt1"/>
+          </a:fillRef>
+          <a:effectRef idx="0">
+            <a:schemeClr val="accent6"/>
+          </a:effectRef>
+          <a:fontRef idx="minor">
+            <a:schemeClr val="dk1"/>
+          </a:fontRef>
+        </p:style>
+        <p:txBody>
+          <a:bodyPr rtlCol="0" anchor="ctr"/>
+          <a:lstStyle/>
+          <a:p>
+            <a:pPr algn="ctr"/>
+            <a:r>
+              <a:rPr lang="de-CH" b="1" dirty="0" err="1" smtClean="0"/>
+              <a:t>TimeActivityReady</a:t>
+            </a:r>
+            <a:endParaRPr lang="de-CH" b="1" dirty="0"/>
+          </a:p>
+        </p:txBody>
+      </p:sp>
+      <p:sp>
+        <p:nvSpPr>
+          <p:cNvPr id="13" name="Ellipse 12"/>
+          <p:cNvSpPr/>
+          <p:nvPr/>
+        </p:nvSpPr>
+        <p:spPr>
+          <a:xfrm>
+            <a:off x="9049924" y="469729"/>
+            <a:ext cx="2582116" cy="1251756"/>
+          </a:xfrm>
+          <a:prstGeom prst="ellipse">
+            <a:avLst/>
+          </a:prstGeom>
+          <a:ln>
+            <a:solidFill>
+              <a:schemeClr val="tx1"/>
+            </a:solidFill>
+          </a:ln>
+        </p:spPr>
+        <p:style>
+          <a:lnRef idx="2">
+            <a:schemeClr val="accent6"/>
+          </a:lnRef>
+          <a:fillRef idx="1">
+            <a:schemeClr val="lt1"/>
+          </a:fillRef>
+          <a:effectRef idx="0">
+            <a:schemeClr val="accent6"/>
+          </a:effectRef>
+          <a:fontRef idx="minor">
+            <a:schemeClr val="dk1"/>
+          </a:fontRef>
+        </p:style>
+        <p:txBody>
+          <a:bodyPr rtlCol="0" anchor="ctr"/>
+          <a:lstStyle/>
+          <a:p>
+            <a:pPr algn="ctr"/>
+            <a:r>
+              <a:rPr lang="de-CH" b="1" dirty="0" err="1" smtClean="0"/>
+              <a:t>InProgress</a:t>
+            </a:r>
+            <a:endParaRPr lang="de-CH" b="1" dirty="0"/>
+          </a:p>
+        </p:txBody>
+      </p:sp>
+      <p:sp>
+        <p:nvSpPr>
+          <p:cNvPr id="14" name="Ellipse 13"/>
+          <p:cNvSpPr/>
+          <p:nvPr/>
+        </p:nvSpPr>
+        <p:spPr>
+          <a:xfrm>
+            <a:off x="7879023" y="2373654"/>
+            <a:ext cx="2582116" cy="1251756"/>
+          </a:xfrm>
+          <a:prstGeom prst="ellipse">
+            <a:avLst/>
+          </a:prstGeom>
+          <a:ln>
+            <a:solidFill>
+              <a:schemeClr val="tx1"/>
+            </a:solidFill>
+          </a:ln>
+        </p:spPr>
+        <p:style>
+          <a:lnRef idx="2">
+            <a:schemeClr val="accent6"/>
+          </a:lnRef>
+          <a:fillRef idx="1">
+            <a:schemeClr val="lt1"/>
+          </a:fillRef>
+          <a:effectRef idx="0">
+            <a:schemeClr val="accent6"/>
+          </a:effectRef>
+          <a:fontRef idx="minor">
+            <a:schemeClr val="dk1"/>
+          </a:fontRef>
+        </p:style>
+        <p:txBody>
+          <a:bodyPr rtlCol="0" anchor="ctr"/>
+          <a:lstStyle/>
+          <a:p>
+            <a:pPr algn="ctr"/>
+            <a:r>
+              <a:rPr lang="de-CH" b="1" dirty="0" err="1" smtClean="0"/>
+              <a:t>FinishedInTime</a:t>
+            </a:r>
+            <a:endParaRPr lang="de-CH" b="1" dirty="0"/>
+          </a:p>
+        </p:txBody>
+      </p:sp>
+      <p:sp>
+        <p:nvSpPr>
+          <p:cNvPr id="15" name="Ellipse 14"/>
+          <p:cNvSpPr/>
+          <p:nvPr/>
+        </p:nvSpPr>
+        <p:spPr>
+          <a:xfrm>
+            <a:off x="7879023" y="3989949"/>
+            <a:ext cx="2582116" cy="1251756"/>
+          </a:xfrm>
+          <a:prstGeom prst="ellipse">
+            <a:avLst/>
+          </a:prstGeom>
+          <a:ln>
+            <a:solidFill>
+              <a:schemeClr val="tx1"/>
+            </a:solidFill>
+          </a:ln>
+        </p:spPr>
+        <p:style>
+          <a:lnRef idx="2">
+            <a:schemeClr val="accent6"/>
+          </a:lnRef>
+          <a:fillRef idx="1">
+            <a:schemeClr val="lt1"/>
+          </a:fillRef>
+          <a:effectRef idx="0">
+            <a:schemeClr val="accent6"/>
+          </a:effectRef>
+          <a:fontRef idx="minor">
+            <a:schemeClr val="dk1"/>
+          </a:fontRef>
+        </p:style>
+        <p:txBody>
+          <a:bodyPr rtlCol="0" anchor="ctr"/>
+          <a:lstStyle/>
+          <a:p>
+            <a:pPr algn="ctr"/>
+            <a:r>
+              <a:rPr lang="de-CH" b="1" dirty="0" err="1" smtClean="0"/>
+              <a:t>FinishedTooLate</a:t>
+            </a:r>
+            <a:endParaRPr lang="de-CH" b="1" dirty="0"/>
+          </a:p>
+        </p:txBody>
+      </p:sp>
+      <p:sp>
+        <p:nvSpPr>
+          <p:cNvPr id="16" name="Ellipse 15"/>
+          <p:cNvSpPr/>
+          <p:nvPr/>
+        </p:nvSpPr>
+        <p:spPr>
+          <a:xfrm>
+            <a:off x="7879023" y="5606244"/>
+            <a:ext cx="2582116" cy="1251756"/>
+          </a:xfrm>
+          <a:prstGeom prst="ellipse">
+            <a:avLst/>
+          </a:prstGeom>
+          <a:ln>
+            <a:solidFill>
+              <a:schemeClr val="tx1"/>
+            </a:solidFill>
+          </a:ln>
+        </p:spPr>
+        <p:style>
+          <a:lnRef idx="2">
+            <a:schemeClr val="accent6"/>
+          </a:lnRef>
+          <a:fillRef idx="1">
+            <a:schemeClr val="lt1"/>
+          </a:fillRef>
+          <a:effectRef idx="0">
+            <a:schemeClr val="accent6"/>
+          </a:effectRef>
+          <a:fontRef idx="minor">
+            <a:schemeClr val="dk1"/>
+          </a:fontRef>
+        </p:style>
+        <p:txBody>
+          <a:bodyPr rtlCol="0" anchor="ctr"/>
+          <a:lstStyle/>
+          <a:p>
+            <a:pPr algn="ctr"/>
+            <a:r>
+              <a:rPr lang="de-CH" b="1" dirty="0" err="1" smtClean="0"/>
+              <a:t>Failed</a:t>
+            </a:r>
+            <a:endParaRPr lang="de-CH" b="1" dirty="0"/>
+          </a:p>
+        </p:txBody>
+      </p:sp>
+      <p:cxnSp>
+        <p:nvCxnSpPr>
+          <p:cNvPr id="17" name="Gerade Verbindung mit Pfeil 16"/>
+          <p:cNvCxnSpPr>
+            <a:stCxn id="12" idx="6"/>
+            <a:endCxn id="13" idx="2"/>
+          </p:cNvCxnSpPr>
+          <p:nvPr/>
+        </p:nvCxnSpPr>
+        <p:spPr>
+          <a:xfrm>
+            <a:off x="7918638" y="1095607"/>
+            <a:ext cx="1131286" cy="0"/>
+          </a:xfrm>
+          <a:prstGeom prst="straightConnector1">
+            <a:avLst/>
+          </a:prstGeom>
+          <a:ln>
+            <a:solidFill>
+              <a:schemeClr val="tx1"/>
+            </a:solidFill>
+            <a:tailEnd type="triangle"/>
+          </a:ln>
+        </p:spPr>
+        <p:style>
+          <a:lnRef idx="1">
+            <a:schemeClr val="accent1"/>
+          </a:lnRef>
+          <a:fillRef idx="0">
+            <a:schemeClr val="accent1"/>
+          </a:fillRef>
+          <a:effectRef idx="0">
+            <a:schemeClr val="accent1"/>
+          </a:effectRef>
+          <a:fontRef idx="minor">
+            <a:schemeClr val="tx1"/>
+          </a:fontRef>
+        </p:style>
+      </p:cxnSp>
+      <p:cxnSp>
+        <p:nvCxnSpPr>
+          <p:cNvPr id="18" name="Gewinkelte Verbindung 17"/>
+          <p:cNvCxnSpPr>
+            <a:stCxn id="13" idx="4"/>
+            <a:endCxn id="14" idx="7"/>
+          </p:cNvCxnSpPr>
+          <p:nvPr/>
+        </p:nvCxnSpPr>
+        <p:spPr>
+          <a:xfrm rot="5400000">
+            <a:off x="9794248" y="2010235"/>
+            <a:ext cx="835484" cy="257985"/>
+          </a:xfrm>
+          <a:prstGeom prst="bentConnector3">
+            <a:avLst/>
+          </a:prstGeom>
+          <a:ln>
+            <a:solidFill>
+              <a:schemeClr val="tx1"/>
+            </a:solidFill>
+            <a:tailEnd type="triangle"/>
+          </a:ln>
+        </p:spPr>
+        <p:style>
+          <a:lnRef idx="1">
+            <a:schemeClr val="accent1"/>
+          </a:lnRef>
+          <a:fillRef idx="0">
+            <a:schemeClr val="accent1"/>
+          </a:fillRef>
+          <a:effectRef idx="0">
+            <a:schemeClr val="accent1"/>
+          </a:effectRef>
+          <a:fontRef idx="minor">
+            <a:schemeClr val="tx1"/>
+          </a:fontRef>
+        </p:style>
+      </p:cxnSp>
+      <p:cxnSp>
+        <p:nvCxnSpPr>
+          <p:cNvPr id="19" name="Gewinkelte Verbindung 18"/>
+          <p:cNvCxnSpPr>
+            <a:stCxn id="13" idx="5"/>
+            <a:endCxn id="15" idx="6"/>
+          </p:cNvCxnSpPr>
+          <p:nvPr/>
+        </p:nvCxnSpPr>
+        <p:spPr>
+          <a:xfrm rot="5400000">
+            <a:off x="9318691" y="2680619"/>
+            <a:ext cx="3077657" cy="792759"/>
+          </a:xfrm>
+          <a:prstGeom prst="bentConnector2">
+            <a:avLst/>
+          </a:prstGeom>
+          <a:ln>
+            <a:solidFill>
+              <a:schemeClr val="tx1"/>
+            </a:solidFill>
+            <a:tailEnd type="triangle"/>
+          </a:ln>
+        </p:spPr>
+        <p:style>
+          <a:lnRef idx="1">
+            <a:schemeClr val="accent1"/>
+          </a:lnRef>
+          <a:fillRef idx="0">
+            <a:schemeClr val="accent1"/>
+          </a:fillRef>
+          <a:effectRef idx="0">
+            <a:schemeClr val="accent1"/>
+          </a:effectRef>
+          <a:fontRef idx="minor">
+            <a:schemeClr val="tx1"/>
+          </a:fontRef>
+        </p:style>
+      </p:cxnSp>
+      <p:cxnSp>
+        <p:nvCxnSpPr>
+          <p:cNvPr id="20" name="Gewinkelte Verbindung 19"/>
+          <p:cNvCxnSpPr>
+            <a:stCxn id="13" idx="6"/>
+            <a:endCxn id="16" idx="6"/>
+          </p:cNvCxnSpPr>
+          <p:nvPr/>
+        </p:nvCxnSpPr>
+        <p:spPr>
+          <a:xfrm flipH="1">
+            <a:off x="10461139" y="1095607"/>
+            <a:ext cx="1170901" cy="5136515"/>
+          </a:xfrm>
+          <a:prstGeom prst="bentConnector3">
+            <a:avLst>
+              <a:gd name="adj1" fmla="val -19523"/>
+            </a:avLst>
+          </a:prstGeom>
+          <a:ln>
+            <a:solidFill>
+              <a:schemeClr val="tx1"/>
+            </a:solidFill>
+            <a:tailEnd type="triangle"/>
+          </a:ln>
+        </p:spPr>
+        <p:style>
+          <a:lnRef idx="1">
+            <a:schemeClr val="accent1"/>
+          </a:lnRef>
+          <a:fillRef idx="0">
+            <a:schemeClr val="accent1"/>
+          </a:fillRef>
+          <a:effectRef idx="0">
+            <a:schemeClr val="accent1"/>
+          </a:effectRef>
+          <a:fontRef idx="minor">
+            <a:schemeClr val="tx1"/>
+          </a:fontRef>
+        </p:style>
+      </p:cxnSp>
+      <p:cxnSp>
+        <p:nvCxnSpPr>
+          <p:cNvPr id="21" name="Gerade Verbindung mit Pfeil 20"/>
+          <p:cNvCxnSpPr>
+            <a:stCxn id="8" idx="4"/>
+            <a:endCxn id="9" idx="0"/>
+          </p:cNvCxnSpPr>
+          <p:nvPr/>
+        </p:nvCxnSpPr>
+        <p:spPr>
+          <a:xfrm flipH="1">
+            <a:off x="1755081" y="1721486"/>
+            <a:ext cx="1" cy="508354"/>
+          </a:xfrm>
+          <a:prstGeom prst="straightConnector1">
+            <a:avLst/>
+          </a:prstGeom>
+          <a:ln>
+            <a:solidFill>
+              <a:schemeClr val="tx1"/>
+            </a:solidFill>
+            <a:tailEnd type="triangle"/>
+          </a:ln>
+        </p:spPr>
+        <p:style>
+          <a:lnRef idx="1">
+            <a:schemeClr val="accent1"/>
+          </a:lnRef>
+          <a:fillRef idx="0">
+            <a:schemeClr val="accent1"/>
+          </a:fillRef>
+          <a:effectRef idx="0">
+            <a:schemeClr val="accent1"/>
+          </a:effectRef>
+          <a:fontRef idx="minor">
+            <a:schemeClr val="tx1"/>
+          </a:fontRef>
+        </p:style>
+      </p:cxnSp>
+      <p:cxnSp>
+        <p:nvCxnSpPr>
+          <p:cNvPr id="22" name="Gerade Verbindung mit Pfeil 21"/>
+          <p:cNvCxnSpPr>
+            <a:stCxn id="9" idx="4"/>
+            <a:endCxn id="10" idx="0"/>
+          </p:cNvCxnSpPr>
+          <p:nvPr/>
+        </p:nvCxnSpPr>
+        <p:spPr>
+          <a:xfrm>
+            <a:off x="1755081" y="3481596"/>
+            <a:ext cx="0" cy="508354"/>
+          </a:xfrm>
+          <a:prstGeom prst="straightConnector1">
+            <a:avLst/>
+          </a:prstGeom>
+          <a:ln>
+            <a:solidFill>
+              <a:schemeClr val="tx1"/>
+            </a:solidFill>
+            <a:tailEnd type="triangle"/>
+          </a:ln>
+        </p:spPr>
+        <p:style>
+          <a:lnRef idx="1">
+            <a:schemeClr val="accent1"/>
+          </a:lnRef>
+          <a:fillRef idx="0">
+            <a:schemeClr val="accent1"/>
+          </a:fillRef>
+          <a:effectRef idx="0">
+            <a:schemeClr val="accent1"/>
+          </a:effectRef>
+          <a:fontRef idx="minor">
+            <a:schemeClr val="tx1"/>
+          </a:fontRef>
+        </p:style>
+      </p:cxnSp>
+      <p:cxnSp>
+        <p:nvCxnSpPr>
+          <p:cNvPr id="23" name="Gerade Verbindung mit Pfeil 22"/>
+          <p:cNvCxnSpPr>
+            <a:stCxn id="10" idx="6"/>
+            <a:endCxn id="11" idx="2"/>
+          </p:cNvCxnSpPr>
+          <p:nvPr/>
+        </p:nvCxnSpPr>
+        <p:spPr>
+          <a:xfrm flipV="1">
+            <a:off x="3046139" y="4274000"/>
+            <a:ext cx="986398" cy="341828"/>
+          </a:xfrm>
+          <a:prstGeom prst="straightConnector1">
+            <a:avLst/>
+          </a:prstGeom>
+          <a:ln>
+            <a:solidFill>
+              <a:schemeClr val="tx1"/>
+            </a:solidFill>
+            <a:tailEnd type="triangle"/>
+          </a:ln>
+        </p:spPr>
+        <p:style>
+          <a:lnRef idx="1">
+            <a:schemeClr val="accent1"/>
+          </a:lnRef>
+          <a:fillRef idx="0">
+            <a:schemeClr val="accent1"/>
+          </a:fillRef>
+          <a:effectRef idx="0">
+            <a:schemeClr val="accent1"/>
+          </a:effectRef>
+          <a:fontRef idx="minor">
+            <a:schemeClr val="tx1"/>
+          </a:fontRef>
+        </p:style>
+      </p:cxnSp>
+      <p:cxnSp>
+        <p:nvCxnSpPr>
+          <p:cNvPr id="24" name="Gerade Verbindung mit Pfeil 23"/>
+          <p:cNvCxnSpPr>
+            <a:stCxn id="14" idx="2"/>
+            <a:endCxn id="11" idx="7"/>
+          </p:cNvCxnSpPr>
+          <p:nvPr/>
+        </p:nvCxnSpPr>
+        <p:spPr>
+          <a:xfrm flipH="1">
+            <a:off x="6236511" y="2999532"/>
+            <a:ext cx="1642512" cy="831905"/>
+          </a:xfrm>
+          <a:prstGeom prst="straightConnector1">
+            <a:avLst/>
+          </a:prstGeom>
+          <a:ln>
+            <a:solidFill>
+              <a:schemeClr val="tx1"/>
+            </a:solidFill>
+            <a:tailEnd type="triangle"/>
+          </a:ln>
+        </p:spPr>
+        <p:style>
+          <a:lnRef idx="1">
+            <a:schemeClr val="accent1"/>
+          </a:lnRef>
+          <a:fillRef idx="0">
+            <a:schemeClr val="accent1"/>
+          </a:fillRef>
+          <a:effectRef idx="0">
+            <a:schemeClr val="accent1"/>
+          </a:effectRef>
+          <a:fontRef idx="minor">
+            <a:schemeClr val="tx1"/>
+          </a:fontRef>
+        </p:style>
+      </p:cxnSp>
+      <p:cxnSp>
+        <p:nvCxnSpPr>
+          <p:cNvPr id="25" name="Gerade Verbindung mit Pfeil 24"/>
+          <p:cNvCxnSpPr>
+            <a:stCxn id="15" idx="2"/>
+            <a:endCxn id="11" idx="6"/>
+          </p:cNvCxnSpPr>
+          <p:nvPr/>
+        </p:nvCxnSpPr>
+        <p:spPr>
+          <a:xfrm flipH="1" flipV="1">
+            <a:off x="6614653" y="4274000"/>
+            <a:ext cx="1264370" cy="341827"/>
+          </a:xfrm>
+          <a:prstGeom prst="straightConnector1">
+            <a:avLst/>
+          </a:prstGeom>
+          <a:ln>
+            <a:solidFill>
+              <a:schemeClr val="tx1"/>
+            </a:solidFill>
+            <a:tailEnd type="triangle"/>
+          </a:ln>
+        </p:spPr>
+        <p:style>
+          <a:lnRef idx="1">
+            <a:schemeClr val="accent1"/>
+          </a:lnRef>
+          <a:fillRef idx="0">
+            <a:schemeClr val="accent1"/>
+          </a:fillRef>
+          <a:effectRef idx="0">
+            <a:schemeClr val="accent1"/>
+          </a:effectRef>
+          <a:fontRef idx="minor">
+            <a:schemeClr val="tx1"/>
+          </a:fontRef>
+        </p:style>
+      </p:cxnSp>
+      <p:cxnSp>
+        <p:nvCxnSpPr>
+          <p:cNvPr id="26" name="Gerade Verbindung mit Pfeil 25"/>
+          <p:cNvCxnSpPr>
+            <a:stCxn id="16" idx="2"/>
+            <a:endCxn id="11" idx="5"/>
+          </p:cNvCxnSpPr>
+          <p:nvPr/>
+        </p:nvCxnSpPr>
+        <p:spPr>
+          <a:xfrm flipH="1" flipV="1">
+            <a:off x="6236511" y="4716563"/>
+            <a:ext cx="1642512" cy="1515559"/>
+          </a:xfrm>
+          <a:prstGeom prst="straightConnector1">
+            <a:avLst/>
+          </a:prstGeom>
+          <a:ln>
+            <a:solidFill>
+              <a:schemeClr val="tx1"/>
+            </a:solidFill>
+            <a:tailEnd type="triangle"/>
+          </a:ln>
+        </p:spPr>
+        <p:style>
+          <a:lnRef idx="1">
+            <a:schemeClr val="accent1"/>
+          </a:lnRef>
+          <a:fillRef idx="0">
+            <a:schemeClr val="accent1"/>
+          </a:fillRef>
+          <a:effectRef idx="0">
+            <a:schemeClr val="accent1"/>
+          </a:effectRef>
+          <a:fontRef idx="minor">
+            <a:schemeClr val="tx1"/>
+          </a:fontRef>
+        </p:style>
+      </p:cxnSp>
+      <p:sp>
+        <p:nvSpPr>
+          <p:cNvPr id="27" name="Ellipse 26"/>
+          <p:cNvSpPr/>
+          <p:nvPr/>
+        </p:nvSpPr>
+        <p:spPr>
+          <a:xfrm>
+            <a:off x="3462983" y="835385"/>
+            <a:ext cx="330134" cy="306553"/>
+          </a:xfrm>
+          <a:prstGeom prst="ellipse">
+            <a:avLst/>
+          </a:prstGeom>
+          <a:solidFill>
+            <a:schemeClr val="tx1"/>
+          </a:solidFill>
+          <a:ln>
+            <a:solidFill>
+              <a:schemeClr val="tx1"/>
+            </a:solidFill>
+          </a:ln>
+        </p:spPr>
+        <p:style>
+          <a:lnRef idx="2">
+            <a:schemeClr val="accent1">
+              <a:shade val="50000"/>
+            </a:schemeClr>
+          </a:lnRef>
+          <a:fillRef idx="1">
+            <a:schemeClr val="accent1"/>
+          </a:fillRef>
+          <a:effectRef idx="0">
+            <a:schemeClr val="accent1"/>
+          </a:effectRef>
+          <a:fontRef idx="minor">
+            <a:schemeClr val="lt1"/>
+          </a:fontRef>
+        </p:style>
+        <p:txBody>
+          <a:bodyPr rtlCol="0" anchor="ctr"/>
+          <a:lstStyle/>
+          <a:p>
+            <a:pPr algn="ctr"/>
+            <a:endParaRPr lang="de-CH"/>
+          </a:p>
+        </p:txBody>
+      </p:sp>
+      <p:sp>
+        <p:nvSpPr>
+          <p:cNvPr id="28" name="Ellipse 27"/>
+          <p:cNvSpPr/>
+          <p:nvPr/>
+        </p:nvSpPr>
+        <p:spPr>
+          <a:xfrm>
+            <a:off x="4270048" y="835385"/>
+            <a:ext cx="330134" cy="306553"/>
+          </a:xfrm>
+          <a:prstGeom prst="ellipse">
+            <a:avLst/>
+          </a:prstGeom>
+          <a:solidFill>
+            <a:schemeClr val="tx1"/>
+          </a:solidFill>
+          <a:ln>
+            <a:solidFill>
+              <a:schemeClr val="tx1"/>
+            </a:solidFill>
+          </a:ln>
+        </p:spPr>
+        <p:style>
+          <a:lnRef idx="2">
+            <a:schemeClr val="accent1">
+              <a:shade val="50000"/>
+            </a:schemeClr>
+          </a:lnRef>
+          <a:fillRef idx="1">
+            <a:schemeClr val="accent1"/>
+          </a:fillRef>
+          <a:effectRef idx="0">
+            <a:schemeClr val="accent1"/>
+          </a:effectRef>
+          <a:fontRef idx="minor">
+            <a:schemeClr val="lt1"/>
+          </a:fontRef>
+        </p:style>
+        <p:txBody>
+          <a:bodyPr rtlCol="0" anchor="ctr"/>
+          <a:lstStyle/>
+          <a:p>
+            <a:pPr algn="ctr"/>
+            <a:endParaRPr lang="de-CH"/>
+          </a:p>
+        </p:txBody>
+      </p:sp>
+      <p:cxnSp>
+        <p:nvCxnSpPr>
+          <p:cNvPr id="29" name="Gerade Verbindung mit Pfeil 28"/>
+          <p:cNvCxnSpPr>
+            <a:stCxn id="27" idx="2"/>
+            <a:endCxn id="8" idx="6"/>
+          </p:cNvCxnSpPr>
+          <p:nvPr/>
+        </p:nvCxnSpPr>
+        <p:spPr>
+          <a:xfrm flipH="1">
+            <a:off x="3046140" y="988662"/>
+            <a:ext cx="416843" cy="106946"/>
+          </a:xfrm>
+          <a:prstGeom prst="straightConnector1">
+            <a:avLst/>
+          </a:prstGeom>
+          <a:ln>
+            <a:solidFill>
+              <a:schemeClr val="tx1"/>
+            </a:solidFill>
+            <a:tailEnd type="triangle"/>
+          </a:ln>
+        </p:spPr>
+        <p:style>
+          <a:lnRef idx="1">
+            <a:schemeClr val="accent1"/>
+          </a:lnRef>
+          <a:fillRef idx="0">
+            <a:schemeClr val="accent1"/>
+          </a:fillRef>
+          <a:effectRef idx="0">
+            <a:schemeClr val="accent1"/>
+          </a:effectRef>
+          <a:fontRef idx="minor">
+            <a:schemeClr val="tx1"/>
+          </a:fontRef>
+        </p:style>
+      </p:cxnSp>
+      <p:cxnSp>
+        <p:nvCxnSpPr>
+          <p:cNvPr id="30" name="Gerade Verbindung mit Pfeil 29"/>
+          <p:cNvCxnSpPr>
+            <a:stCxn id="28" idx="6"/>
+            <a:endCxn id="12" idx="2"/>
+          </p:cNvCxnSpPr>
+          <p:nvPr/>
+        </p:nvCxnSpPr>
+        <p:spPr>
+          <a:xfrm>
+            <a:off x="4600182" y="988662"/>
+            <a:ext cx="736340" cy="106945"/>
+          </a:xfrm>
+          <a:prstGeom prst="straightConnector1">
+            <a:avLst/>
+          </a:prstGeom>
+          <a:ln>
+            <a:solidFill>
+              <a:schemeClr val="tx1"/>
+            </a:solidFill>
+            <a:tailEnd type="triangle"/>
+          </a:ln>
+        </p:spPr>
+        <p:style>
+          <a:lnRef idx="1">
+            <a:schemeClr val="accent1"/>
+          </a:lnRef>
+          <a:fillRef idx="0">
+            <a:schemeClr val="accent1"/>
+          </a:fillRef>
+          <a:effectRef idx="0">
+            <a:schemeClr val="accent1"/>
+          </a:effectRef>
+          <a:fontRef idx="minor">
+            <a:schemeClr val="tx1"/>
+          </a:fontRef>
+        </p:style>
+      </p:cxnSp>
+      <p:sp>
+        <p:nvSpPr>
+          <p:cNvPr id="31" name="Ellipse 30"/>
+          <p:cNvSpPr/>
+          <p:nvPr/>
+        </p:nvSpPr>
+        <p:spPr>
+          <a:xfrm>
+            <a:off x="5046684" y="5542601"/>
+            <a:ext cx="330134" cy="306553"/>
+          </a:xfrm>
+          <a:prstGeom prst="ellipse">
+            <a:avLst/>
+          </a:prstGeom>
+          <a:solidFill>
+            <a:schemeClr val="tx1"/>
+          </a:solidFill>
+          <a:ln>
+            <a:solidFill>
+              <a:schemeClr val="tx1"/>
+            </a:solidFill>
+          </a:ln>
+        </p:spPr>
+        <p:style>
+          <a:lnRef idx="2">
+            <a:schemeClr val="accent1">
+              <a:shade val="50000"/>
+            </a:schemeClr>
+          </a:lnRef>
+          <a:fillRef idx="1">
+            <a:schemeClr val="accent1"/>
+          </a:fillRef>
+          <a:effectRef idx="0">
+            <a:schemeClr val="accent1"/>
+          </a:effectRef>
+          <a:fontRef idx="minor">
+            <a:schemeClr val="lt1"/>
+          </a:fontRef>
+        </p:style>
+        <p:txBody>
+          <a:bodyPr rtlCol="0" anchor="ctr"/>
+          <a:lstStyle/>
+          <a:p>
+            <a:pPr algn="ctr"/>
+            <a:endParaRPr lang="de-CH"/>
+          </a:p>
+        </p:txBody>
+      </p:sp>
+      <p:cxnSp>
+        <p:nvCxnSpPr>
+          <p:cNvPr id="32" name="Gerade Verbindung mit Pfeil 31"/>
+          <p:cNvCxnSpPr>
+            <a:stCxn id="11" idx="4"/>
+            <a:endCxn id="31" idx="0"/>
+          </p:cNvCxnSpPr>
+          <p:nvPr/>
+        </p:nvCxnSpPr>
+        <p:spPr>
+          <a:xfrm flipH="1">
+            <a:off x="5211751" y="4899878"/>
+            <a:ext cx="111844" cy="642723"/>
+          </a:xfrm>
+          <a:prstGeom prst="straightConnector1">
+            <a:avLst/>
+          </a:prstGeom>
+          <a:ln>
+            <a:solidFill>
+              <a:schemeClr val="tx1"/>
+            </a:solidFill>
+            <a:tailEnd type="triangle"/>
+          </a:ln>
+        </p:spPr>
+        <p:style>
+          <a:lnRef idx="1">
+            <a:schemeClr val="accent1"/>
+          </a:lnRef>
+          <a:fillRef idx="0">
+            <a:schemeClr val="accent1"/>
+          </a:fillRef>
+          <a:effectRef idx="0">
+            <a:schemeClr val="accent1"/>
+          </a:effectRef>
+          <a:fontRef idx="minor">
+            <a:schemeClr val="tx1"/>
+          </a:fontRef>
+        </p:style>
+      </p:cxnSp>
+      <p:sp>
+        <p:nvSpPr>
+          <p:cNvPr id="33" name="Textfeld 32"/>
           <p:cNvSpPr txBox="1"/>
           <p:nvPr/>
         </p:nvSpPr>
         <p:spPr>
           <a:xfrm>
-            <a:off x="145142" y="0"/>
-            <a:ext cx="8794459" cy="769441"/>
+            <a:off x="3334168" y="1232302"/>
+            <a:ext cx="1624213" cy="369332"/>
+          </a:xfrm>
+          <a:prstGeom prst="rect">
+            <a:avLst/>
+          </a:prstGeom>
+          <a:noFill/>
+        </p:spPr>
+        <p:txBody>
+          <a:bodyPr wrap="square" rtlCol="0">
+            <a:spAutoFit/>
+          </a:bodyPr>
+          <a:lstStyle/>
+          <a:p>
+            <a:r>
+              <a:rPr lang="de-CH" dirty="0" smtClean="0"/>
+              <a:t>Initialisierung</a:t>
+            </a:r>
+            <a:endParaRPr lang="de-CH" dirty="0"/>
+          </a:p>
+        </p:txBody>
+      </p:sp>
+      <p:sp>
+        <p:nvSpPr>
+          <p:cNvPr id="34" name="Textfeld 33"/>
+          <p:cNvSpPr txBox="1"/>
+          <p:nvPr/>
+        </p:nvSpPr>
+        <p:spPr>
+          <a:xfrm>
+            <a:off x="1823349" y="1724653"/>
+            <a:ext cx="1475138" cy="369332"/>
+          </a:xfrm>
+          <a:prstGeom prst="rect">
+            <a:avLst/>
+          </a:prstGeom>
+          <a:noFill/>
+        </p:spPr>
+        <p:txBody>
+          <a:bodyPr wrap="square" rtlCol="0">
+            <a:spAutoFit/>
+          </a:bodyPr>
+          <a:lstStyle/>
+          <a:p>
+            <a:r>
+              <a:rPr lang="de-CH" dirty="0" err="1" smtClean="0"/>
+              <a:t>nextState</a:t>
+            </a:r>
+            <a:r>
+              <a:rPr lang="de-CH" dirty="0" smtClean="0"/>
+              <a:t>()</a:t>
+            </a:r>
+            <a:endParaRPr lang="de-CH" dirty="0"/>
+          </a:p>
+        </p:txBody>
+      </p:sp>
+      <p:sp>
+        <p:nvSpPr>
+          <p:cNvPr id="35" name="Textfeld 34"/>
+          <p:cNvSpPr txBox="1"/>
+          <p:nvPr/>
+        </p:nvSpPr>
+        <p:spPr>
+          <a:xfrm>
+            <a:off x="1839580" y="3512808"/>
+            <a:ext cx="1669157" cy="369332"/>
+          </a:xfrm>
+          <a:prstGeom prst="rect">
+            <a:avLst/>
+          </a:prstGeom>
+          <a:noFill/>
+        </p:spPr>
+        <p:txBody>
+          <a:bodyPr wrap="square" rtlCol="0">
+            <a:spAutoFit/>
+          </a:bodyPr>
+          <a:lstStyle/>
+          <a:p>
+            <a:r>
+              <a:rPr lang="de-CH" dirty="0" err="1" smtClean="0"/>
+              <a:t>nextState</a:t>
+            </a:r>
+            <a:r>
+              <a:rPr lang="de-CH" dirty="0" smtClean="0"/>
+              <a:t>()</a:t>
+            </a:r>
+            <a:endParaRPr lang="de-CH" dirty="0"/>
+          </a:p>
+        </p:txBody>
+      </p:sp>
+      <p:sp>
+        <p:nvSpPr>
+          <p:cNvPr id="36" name="Textfeld 35"/>
+          <p:cNvSpPr txBox="1"/>
+          <p:nvPr/>
+        </p:nvSpPr>
+        <p:spPr>
+          <a:xfrm>
+            <a:off x="6304268" y="2781185"/>
+            <a:ext cx="1306595" cy="369332"/>
+          </a:xfrm>
+          <a:prstGeom prst="rect">
+            <a:avLst/>
+          </a:prstGeom>
+          <a:noFill/>
+        </p:spPr>
+        <p:txBody>
+          <a:bodyPr wrap="square" rtlCol="0">
+            <a:spAutoFit/>
+          </a:bodyPr>
+          <a:lstStyle/>
+          <a:p>
+            <a:r>
+              <a:rPr lang="de-CH" dirty="0" err="1" smtClean="0"/>
+              <a:t>nextState</a:t>
+            </a:r>
+            <a:r>
+              <a:rPr lang="de-CH" dirty="0" smtClean="0"/>
+              <a:t>()</a:t>
+            </a:r>
+            <a:endParaRPr lang="de-CH" dirty="0"/>
+          </a:p>
+        </p:txBody>
+      </p:sp>
+      <p:sp>
+        <p:nvSpPr>
+          <p:cNvPr id="37" name="Textfeld 36"/>
+          <p:cNvSpPr txBox="1"/>
+          <p:nvPr/>
+        </p:nvSpPr>
+        <p:spPr>
+          <a:xfrm>
+            <a:off x="6801607" y="3813783"/>
+            <a:ext cx="1434967" cy="369332"/>
+          </a:xfrm>
+          <a:prstGeom prst="rect">
+            <a:avLst/>
+          </a:prstGeom>
+          <a:noFill/>
+        </p:spPr>
+        <p:txBody>
+          <a:bodyPr wrap="square" rtlCol="0">
+            <a:spAutoFit/>
+          </a:bodyPr>
+          <a:lstStyle/>
+          <a:p>
+            <a:r>
+              <a:rPr lang="de-CH" dirty="0" err="1" smtClean="0"/>
+              <a:t>nextState</a:t>
+            </a:r>
+            <a:r>
+              <a:rPr lang="de-CH" dirty="0" smtClean="0"/>
+              <a:t>()</a:t>
+            </a:r>
+            <a:endParaRPr lang="de-CH" dirty="0"/>
+          </a:p>
+        </p:txBody>
+      </p:sp>
+      <p:sp>
+        <p:nvSpPr>
+          <p:cNvPr id="38" name="Textfeld 37"/>
+          <p:cNvSpPr txBox="1"/>
+          <p:nvPr/>
+        </p:nvSpPr>
+        <p:spPr>
+          <a:xfrm>
+            <a:off x="7226680" y="5269021"/>
+            <a:ext cx="1383915" cy="369332"/>
+          </a:xfrm>
+          <a:prstGeom prst="rect">
+            <a:avLst/>
+          </a:prstGeom>
+          <a:noFill/>
+        </p:spPr>
+        <p:txBody>
+          <a:bodyPr wrap="square" rtlCol="0">
+            <a:spAutoFit/>
+          </a:bodyPr>
+          <a:lstStyle/>
+          <a:p>
+            <a:r>
+              <a:rPr lang="de-CH" dirty="0" err="1" smtClean="0"/>
+              <a:t>nextState</a:t>
+            </a:r>
+            <a:r>
+              <a:rPr lang="de-CH" dirty="0" smtClean="0"/>
+              <a:t>()</a:t>
+            </a:r>
+            <a:endParaRPr lang="de-CH" dirty="0"/>
+          </a:p>
+        </p:txBody>
+      </p:sp>
+      <p:sp>
+        <p:nvSpPr>
+          <p:cNvPr id="39" name="Textfeld 38"/>
+          <p:cNvSpPr txBox="1"/>
+          <p:nvPr/>
+        </p:nvSpPr>
+        <p:spPr>
+          <a:xfrm>
+            <a:off x="8051507" y="601509"/>
+            <a:ext cx="932990" cy="369332"/>
+          </a:xfrm>
+          <a:prstGeom prst="rect">
+            <a:avLst/>
+          </a:prstGeom>
+          <a:noFill/>
+        </p:spPr>
+        <p:txBody>
+          <a:bodyPr wrap="square" rtlCol="0">
+            <a:spAutoFit/>
+          </a:bodyPr>
+          <a:lstStyle/>
+          <a:p>
+            <a:r>
+              <a:rPr lang="de-CH" dirty="0" err="1" smtClean="0"/>
+              <a:t>start</a:t>
+            </a:r>
+            <a:r>
+              <a:rPr lang="de-CH" dirty="0" smtClean="0"/>
+              <a:t>()</a:t>
+            </a:r>
+            <a:endParaRPr lang="de-CH" dirty="0"/>
+          </a:p>
+        </p:txBody>
+      </p:sp>
+      <p:sp>
+        <p:nvSpPr>
+          <p:cNvPr id="40" name="Textfeld 39"/>
+          <p:cNvSpPr txBox="1"/>
+          <p:nvPr/>
+        </p:nvSpPr>
+        <p:spPr>
+          <a:xfrm>
+            <a:off x="8511429" y="1783380"/>
+            <a:ext cx="1592157" cy="646331"/>
+          </a:xfrm>
+          <a:prstGeom prst="rect">
+            <a:avLst/>
+          </a:prstGeom>
+          <a:noFill/>
+        </p:spPr>
+        <p:txBody>
+          <a:bodyPr wrap="square" rtlCol="0">
+            <a:spAutoFit/>
+          </a:bodyPr>
+          <a:lstStyle/>
+          <a:p>
+            <a:r>
+              <a:rPr lang="de-CH" dirty="0" err="1" smtClean="0"/>
+              <a:t>Softtimelimit</a:t>
+            </a:r>
+            <a:r>
+              <a:rPr lang="de-CH" dirty="0" smtClean="0"/>
+              <a:t> OK</a:t>
+            </a:r>
+            <a:endParaRPr lang="de-CH" dirty="0"/>
+          </a:p>
+        </p:txBody>
+      </p:sp>
+      <p:sp>
+        <p:nvSpPr>
+          <p:cNvPr id="41" name="Textfeld 40"/>
+          <p:cNvSpPr txBox="1"/>
+          <p:nvPr/>
+        </p:nvSpPr>
+        <p:spPr>
+          <a:xfrm>
+            <a:off x="9648053" y="3491005"/>
+            <a:ext cx="1721652" cy="646331"/>
+          </a:xfrm>
+          <a:prstGeom prst="rect">
+            <a:avLst/>
+          </a:prstGeom>
+          <a:noFill/>
+        </p:spPr>
+        <p:txBody>
+          <a:bodyPr wrap="square" rtlCol="0">
+            <a:spAutoFit/>
+          </a:bodyPr>
+          <a:lstStyle/>
+          <a:p>
+            <a:r>
+              <a:rPr lang="de-CH" dirty="0" err="1" smtClean="0"/>
+              <a:t>Softtimelimit</a:t>
+            </a:r>
+            <a:r>
+              <a:rPr lang="de-CH" dirty="0" smtClean="0"/>
+              <a:t> NOK</a:t>
+            </a:r>
+            <a:endParaRPr lang="de-CH" dirty="0"/>
+          </a:p>
+        </p:txBody>
+      </p:sp>
+      <p:sp>
+        <p:nvSpPr>
+          <p:cNvPr id="42" name="Textfeld 41"/>
+          <p:cNvSpPr txBox="1"/>
+          <p:nvPr/>
+        </p:nvSpPr>
+        <p:spPr>
+          <a:xfrm>
+            <a:off x="10103587" y="5299930"/>
+            <a:ext cx="1796613" cy="646331"/>
+          </a:xfrm>
+          <a:prstGeom prst="rect">
+            <a:avLst/>
+          </a:prstGeom>
+          <a:noFill/>
+        </p:spPr>
+        <p:txBody>
+          <a:bodyPr wrap="square" rtlCol="0">
+            <a:spAutoFit/>
+          </a:bodyPr>
+          <a:lstStyle/>
+          <a:p>
+            <a:r>
+              <a:rPr lang="de-CH" dirty="0" err="1" smtClean="0"/>
+              <a:t>Hardtimelimit</a:t>
+            </a:r>
+            <a:r>
+              <a:rPr lang="de-CH" dirty="0" smtClean="0"/>
+              <a:t> NOK</a:t>
+            </a:r>
+            <a:endParaRPr lang="de-CH" dirty="0"/>
+          </a:p>
+        </p:txBody>
+      </p:sp>
+      <p:sp>
+        <p:nvSpPr>
+          <p:cNvPr id="43" name="Textfeld 42"/>
+          <p:cNvSpPr txBox="1"/>
+          <p:nvPr/>
+        </p:nvSpPr>
+        <p:spPr>
+          <a:xfrm>
+            <a:off x="-1890058" y="5750060"/>
+            <a:ext cx="6036332" cy="769441"/>
           </a:xfrm>
           <a:prstGeom prst="rect">
             <a:avLst/>
@@ -3957,31 +5364,7 @@
                   <a:srgbClr val="FF0000"/>
                 </a:solidFill>
               </a:rPr>
-              <a:t>Klassendiagramm </a:t>
-            </a:r>
-            <a:r>
-              <a:rPr lang="de-CH" sz="4400" dirty="0" err="1" smtClean="0">
-                <a:solidFill>
-                  <a:srgbClr val="FF0000"/>
-                </a:solidFill>
-              </a:rPr>
-              <a:t>StatePattern</a:t>
-            </a:r>
-            <a:r>
-              <a:rPr lang="de-CH" sz="4400" dirty="0" smtClean="0">
-                <a:solidFill>
-                  <a:srgbClr val="FF0000"/>
-                </a:solidFill>
-              </a:rPr>
-              <a:t> </a:t>
-            </a:r>
-            <a:r>
-              <a:rPr lang="de-CH" sz="4400" dirty="0" err="1" smtClean="0">
-                <a:solidFill>
-                  <a:srgbClr val="FF0000"/>
-                </a:solidFill>
-              </a:rPr>
-              <a:t>LifeUp</a:t>
+              <a:t>                 State Diagramm</a:t>
             </a:r>
             <a:endParaRPr lang="de-CH" sz="4400" dirty="0">
               <a:solidFill>
@@ -3991,34 +5374,40 @@
           </a:p>
         </p:txBody>
       </p:sp>
-      <p:pic>
-        <p:nvPicPr>
-          <p:cNvPr id="4" name="Grafik 3"/>
-          <p:cNvPicPr>
-            <a:picLocks noChangeAspect="1"/>
-          </p:cNvPicPr>
+      <p:sp>
+        <p:nvSpPr>
+          <p:cNvPr id="44" name="Textfeld 43"/>
+          <p:cNvSpPr txBox="1"/>
           <p:nvPr/>
-        </p:nvPicPr>
-        <p:blipFill>
-          <a:blip r:embed="rId2"/>
-          <a:stretch>
-            <a:fillRect/>
-          </a:stretch>
-        </p:blipFill>
-        <p:spPr>
-          <a:xfrm>
-            <a:off x="1644031" y="884961"/>
-            <a:ext cx="8916644" cy="5715798"/>
+        </p:nvSpPr>
+        <p:spPr>
+          <a:xfrm>
+            <a:off x="4496937" y="5966968"/>
+            <a:ext cx="1624213" cy="369332"/>
           </a:xfrm>
           <a:prstGeom prst="rect">
             <a:avLst/>
           </a:prstGeom>
-        </p:spPr>
-      </p:pic>
+          <a:noFill/>
+        </p:spPr>
+        <p:txBody>
+          <a:bodyPr wrap="square" rtlCol="0">
+            <a:spAutoFit/>
+          </a:bodyPr>
+          <a:lstStyle/>
+          <a:p>
+            <a:r>
+              <a:rPr lang="de-CH" dirty="0" smtClean="0"/>
+              <a:t>Abschluss</a:t>
+            </a:r>
+            <a:endParaRPr lang="de-CH" dirty="0"/>
+          </a:p>
+        </p:txBody>
+      </p:sp>
     </p:spTree>
     <p:extLst>
       <p:ext uri="{BB962C8B-B14F-4D97-AF65-F5344CB8AC3E}">
-        <p14:creationId xmlns:p14="http://schemas.microsoft.com/office/powerpoint/2010/main" val="3136378812"/>
+        <p14:creationId xmlns:p14="http://schemas.microsoft.com/office/powerpoint/2010/main" val="3568758873"/>
       </p:ext>
     </p:extLst>
   </p:cSld>
@@ -4157,7 +5546,7 @@
         </p:nvSpPr>
         <p:spPr>
           <a:xfrm>
-            <a:off x="494683" y="353666"/>
+            <a:off x="145142" y="0"/>
             <a:ext cx="8794459" cy="769441"/>
           </a:xfrm>
           <a:prstGeom prst="rect">
@@ -4213,7 +5602,7 @@
       </p:sp>
       <p:pic>
         <p:nvPicPr>
-          <p:cNvPr id="9" name="Grafik 8"/>
+          <p:cNvPr id="3" name="Grafik 2"/>
           <p:cNvPicPr>
             <a:picLocks noChangeAspect="1"/>
           </p:cNvPicPr>
@@ -4227,8 +5616,8 @@
         </p:blipFill>
         <p:spPr>
           <a:xfrm>
-            <a:off x="2198547" y="1359105"/>
-            <a:ext cx="7440063" cy="5382376"/>
+            <a:off x="1066222" y="769441"/>
+            <a:ext cx="9669224" cy="6049219"/>
           </a:xfrm>
           <a:prstGeom prst="rect">
             <a:avLst/>
@@ -4238,7 +5627,7 @@
     </p:spTree>
     <p:extLst>
       <p:ext uri="{BB962C8B-B14F-4D97-AF65-F5344CB8AC3E}">
-        <p14:creationId xmlns:p14="http://schemas.microsoft.com/office/powerpoint/2010/main" val="190805610"/>
+        <p14:creationId xmlns:p14="http://schemas.microsoft.com/office/powerpoint/2010/main" val="3136378812"/>
       </p:ext>
     </p:extLst>
   </p:cSld>
@@ -4313,164 +5702,6 @@
       </p:sp>
       <p:sp>
         <p:nvSpPr>
-          <p:cNvPr id="6" name="Titel 1"/>
-          <p:cNvSpPr txBox="1">
-            <a:spLocks/>
-          </p:cNvSpPr>
-          <p:nvPr/>
-        </p:nvSpPr>
-        <p:spPr>
-          <a:xfrm>
-            <a:off x="130114" y="115520"/>
-            <a:ext cx="10430561" cy="1245734"/>
-          </a:xfrm>
-          <a:prstGeom prst="rect">
-            <a:avLst/>
-          </a:prstGeom>
-        </p:spPr>
-        <p:txBody>
-          <a:bodyPr vert="horz" lIns="91440" tIns="45720" rIns="91440" bIns="45720" rtlCol="0" anchor="b">
-            <a:normAutofit fontScale="70000" lnSpcReduction="20000"/>
-          </a:bodyPr>
-          <a:lstStyle>
-            <a:lvl1pPr algn="ctr" defTabSz="914400" rtl="0" eaLnBrk="1" latinLnBrk="0" hangingPunct="1">
-              <a:lnSpc>
-                <a:spcPct val="90000"/>
-              </a:lnSpc>
-              <a:spcBef>
-                <a:spcPct val="0"/>
-              </a:spcBef>
-              <a:buNone/>
-              <a:defRPr sz="6000" kern="1200">
-                <a:solidFill>
-                  <a:schemeClr val="tx1"/>
-                </a:solidFill>
-                <a:latin typeface="+mj-lt"/>
-                <a:ea typeface="+mj-ea"/>
-                <a:cs typeface="+mj-cs"/>
-              </a:defRPr>
-            </a:lvl1pPr>
-          </a:lstStyle>
-          <a:p>
-            <a:pPr algn="l"/>
-            <a:r>
-              <a:rPr lang="de-CH" sz="7200" b="1" dirty="0" smtClean="0">
-                <a:solidFill>
-                  <a:schemeClr val="bg1"/>
-                </a:solidFill>
-              </a:rPr>
-              <a:t>Implementierung / Klassendiagramm</a:t>
-            </a:r>
-            <a:endParaRPr lang="de-CH" sz="7200" b="1" dirty="0">
-              <a:solidFill>
-                <a:schemeClr val="bg1"/>
-              </a:solidFill>
-            </a:endParaRPr>
-          </a:p>
-        </p:txBody>
-      </p:sp>
-      <p:pic>
-        <p:nvPicPr>
-          <p:cNvPr id="3" name="Grafik 2"/>
-          <p:cNvPicPr>
-            <a:picLocks noChangeAspect="1"/>
-          </p:cNvPicPr>
-          <p:nvPr/>
-        </p:nvPicPr>
-        <p:blipFill>
-          <a:blip r:embed="rId2"/>
-          <a:stretch>
-            <a:fillRect/>
-          </a:stretch>
-        </p:blipFill>
-        <p:spPr>
-          <a:xfrm>
-            <a:off x="0" y="251998"/>
-            <a:ext cx="12451522" cy="5370618"/>
-          </a:xfrm>
-          <a:prstGeom prst="rect">
-            <a:avLst/>
-          </a:prstGeom>
-        </p:spPr>
-      </p:pic>
-    </p:spTree>
-    <p:extLst>
-      <p:ext uri="{BB962C8B-B14F-4D97-AF65-F5344CB8AC3E}">
-        <p14:creationId xmlns:p14="http://schemas.microsoft.com/office/powerpoint/2010/main" val="2756599055"/>
-      </p:ext>
-    </p:extLst>
-  </p:cSld>
-  <p:clrMapOvr>
-    <a:masterClrMapping/>
-  </p:clrMapOvr>
-  <p:timing>
-    <p:tnLst>
-      <p:par>
-        <p:cTn id="1" dur="indefinite" restart="never" nodeType="tmRoot"/>
-      </p:par>
-    </p:tnLst>
-  </p:timing>
-</p:sld>
-</file>
-
-<file path=ppt/slides/slide8.xml><?xml version="1.0" encoding="utf-8"?>
-<p:sld xmlns:a="http://schemas.openxmlformats.org/drawingml/2006/main" xmlns:r="http://schemas.openxmlformats.org/officeDocument/2006/relationships" xmlns:p="http://schemas.openxmlformats.org/presentationml/2006/main">
-  <p:cSld>
-    <p:spTree>
-      <p:nvGrpSpPr>
-        <p:cNvPr id="1" name=""/>
-        <p:cNvGrpSpPr/>
-        <p:nvPr/>
-      </p:nvGrpSpPr>
-      <p:grpSpPr>
-        <a:xfrm>
-          <a:off x="0" y="0"/>
-          <a:ext cx="0" cy="0"/>
-          <a:chOff x="0" y="0"/>
-          <a:chExt cx="0" cy="0"/>
-        </a:xfrm>
-      </p:grpSpPr>
-      <p:sp>
-        <p:nvSpPr>
-          <p:cNvPr id="2" name="Titel 1"/>
-          <p:cNvSpPr>
-            <a:spLocks noGrp="1"/>
-          </p:cNvSpPr>
-          <p:nvPr>
-            <p:ph type="ctrTitle"/>
-          </p:nvPr>
-        </p:nvSpPr>
-        <p:spPr>
-          <a:xfrm>
-            <a:off x="145142" y="117668"/>
-            <a:ext cx="9144000" cy="1245734"/>
-          </a:xfrm>
-        </p:spPr>
-        <p:txBody>
-          <a:bodyPr>
-            <a:normAutofit/>
-          </a:bodyPr>
-          <a:lstStyle/>
-          <a:p>
-            <a:pPr algn="l"/>
-            <a:r>
-              <a:rPr lang="de-CH" sz="7200" b="1" dirty="0" smtClean="0">
-                <a:solidFill>
-                  <a:schemeClr val="bg1"/>
-                </a:solidFill>
-              </a:rPr>
-              <a:t>Architekturdiagramm</a:t>
-            </a:r>
-            <a:endParaRPr lang="de-CH" sz="7200" b="1" dirty="0">
-              <a:solidFill>
-                <a:schemeClr val="bg1"/>
-              </a:solidFill>
-            </a:endParaRPr>
-          </a:p>
-        </p:txBody>
-      </p:sp>
-      <p:sp>
-        <p:nvSpPr>
           <p:cNvPr id="5" name="Rechteck 4"/>
           <p:cNvSpPr/>
           <p:nvPr/>
@@ -4617,7 +5848,7 @@
 </p:sld>
 </file>
 
-<file path=ppt/slides/slide9.xml><?xml version="1.0" encoding="utf-8"?>
+<file path=ppt/slides/slide8.xml><?xml version="1.0" encoding="utf-8"?>
 <p:sld xmlns:a="http://schemas.openxmlformats.org/drawingml/2006/main" xmlns:r="http://schemas.openxmlformats.org/officeDocument/2006/relationships" xmlns:p="http://schemas.openxmlformats.org/presentationml/2006/main">
   <p:cSld>
     <p:spTree>

</xml_diff>